<commit_message>
Add almost done protection present.
</commit_message>
<xml_diff>
--- a/protection/new-style/Свиридов Лев 11Ф Защита проекта.pptx
+++ b/protection/new-style/Свиридов Лев 11Ф Защита проекта.pptx
@@ -9,7 +9,10 @@
     <p:sldId id="275" r:id="rId3"/>
     <p:sldId id="276" r:id="rId4"/>
     <p:sldId id="280" r:id="rId5"/>
-    <p:sldId id="278" r:id="rId6"/>
+    <p:sldId id="281" r:id="rId6"/>
+    <p:sldId id="282" r:id="rId7"/>
+    <p:sldId id="283" r:id="rId8"/>
+    <p:sldId id="278" r:id="rId9"/>
   </p:sldIdLst>
   <p:sldSz cx="12192000" cy="6858000"/>
   <p:notesSz cx="6858000" cy="9144000"/>
@@ -114,6 +117,18 @@
     </p:ext>
   </p:extLst>
 </p:presentation>
+</file>
+
+<file path=ppt/commentAuthors.xml><?xml version="1.0" encoding="utf-8"?>
+<p:cmAuthorLst xmlns:a="http://schemas.openxmlformats.org/drawingml/2006/main" xmlns:r="http://schemas.openxmlformats.org/officeDocument/2006/relationships" xmlns:p="http://schemas.openxmlformats.org/presentationml/2006/main">
+  <p:cmAuthor id="1" name="lev" initials="l" lastIdx="1" clrIdx="0">
+    <p:extLst>
+      <p:ext uri="{19B8F6BF-5375-455C-9EA6-DF929625EA0E}">
+        <p15:presenceInfo xmlns:p15="http://schemas.microsoft.com/office/powerpoint/2012/main" userId="lev" providerId="None"/>
+      </p:ext>
+    </p:extLst>
+  </p:cmAuthor>
+</p:cmAuthorLst>
 </file>
 
 <file path=ppt/slideLayouts/slideLayout1.xml><?xml version="1.0" encoding="utf-8"?>
@@ -3582,7 +3597,7 @@
             </a:r>
             <a:r>
               <a:rPr lang="ru-RU" sz="2000" dirty="0"/>
-              <a:t>выполнялась методом обобщения  знаний о семействе ОС </a:t>
+              <a:t>выполнялась методом анализа своих знаний о семействе ОС </a:t>
             </a:r>
             <a:r>
               <a:rPr lang="en-US" sz="2000" dirty="0"/>
@@ -3647,6 +3662,55 @@
       </p:grpSpPr>
       <p:sp>
         <p:nvSpPr>
+          <p:cNvPr id="5" name="Прямоугольник 4">
+            <a:extLst>
+              <a:ext uri="{FF2B5EF4-FFF2-40B4-BE49-F238E27FC236}">
+                <a16:creationId xmlns:a16="http://schemas.microsoft.com/office/drawing/2014/main" id="{F98139C0-DA60-48CF-9524-594DA26AFADA}"/>
+              </a:ext>
+            </a:extLst>
+          </p:cNvPr>
+          <p:cNvSpPr/>
+          <p:nvPr/>
+        </p:nvSpPr>
+        <p:spPr>
+          <a:xfrm>
+            <a:off x="-1" y="769441"/>
+            <a:ext cx="6095999" cy="6088559"/>
+          </a:xfrm>
+          <a:prstGeom prst="rect">
+            <a:avLst/>
+          </a:prstGeom>
+          <a:solidFill>
+            <a:schemeClr val="tx1"/>
+          </a:solidFill>
+        </p:spPr>
+        <p:style>
+          <a:lnRef idx="2">
+            <a:schemeClr val="accent1">
+              <a:shade val="50000"/>
+            </a:schemeClr>
+          </a:lnRef>
+          <a:fillRef idx="1">
+            <a:schemeClr val="accent1"/>
+          </a:fillRef>
+          <a:effectRef idx="0">
+            <a:schemeClr val="accent1"/>
+          </a:effectRef>
+          <a:fontRef idx="minor">
+            <a:schemeClr val="lt1"/>
+          </a:fontRef>
+        </p:style>
+        <p:txBody>
+          <a:bodyPr rtlCol="0" anchor="ctr"/>
+          <a:lstStyle/>
+          <a:p>
+            <a:pPr algn="ctr"/>
+            <a:endParaRPr lang="ru-RU"/>
+          </a:p>
+        </p:txBody>
+      </p:sp>
+      <p:sp>
+        <p:nvSpPr>
           <p:cNvPr id="6" name="Прямоугольник 5"/>
           <p:cNvSpPr/>
           <p:nvPr/>
@@ -3680,16 +3744,58 @@
           </a:p>
         </p:txBody>
       </p:sp>
-      <p:sp>
-        <p:nvSpPr>
-          <p:cNvPr id="3" name="TextBox 2"/>
+      <p:pic>
+        <p:nvPicPr>
+          <p:cNvPr id="4" name="Рисунок 3">
+            <a:extLst>
+              <a:ext uri="{FF2B5EF4-FFF2-40B4-BE49-F238E27FC236}">
+                <a16:creationId xmlns:a16="http://schemas.microsoft.com/office/drawing/2014/main" id="{A8F961DD-4C1C-4619-8994-B63F6EF72FBE}"/>
+              </a:ext>
+            </a:extLst>
+          </p:cNvPr>
+          <p:cNvPicPr>
+            <a:picLocks noChangeAspect="1"/>
+          </p:cNvPicPr>
+          <p:nvPr/>
+        </p:nvPicPr>
+        <p:blipFill>
+          <a:blip r:embed="rId2">
+            <a:extLst>
+              <a:ext uri="{28A0092B-C50C-407E-A947-70E740481C1C}">
+                <a14:useLocalDpi xmlns:a14="http://schemas.microsoft.com/office/drawing/2010/main" val="0"/>
+              </a:ext>
+            </a:extLst>
+          </a:blip>
+          <a:stretch>
+            <a:fillRect/>
+          </a:stretch>
+        </p:blipFill>
+        <p:spPr>
+          <a:xfrm>
+            <a:off x="0" y="2057295"/>
+            <a:ext cx="6096000" cy="3334537"/>
+          </a:xfrm>
+          <a:prstGeom prst="rect">
+            <a:avLst/>
+          </a:prstGeom>
+        </p:spPr>
+      </p:pic>
+      <p:sp>
+        <p:nvSpPr>
+          <p:cNvPr id="8" name="TextBox 7">
+            <a:extLst>
+              <a:ext uri="{FF2B5EF4-FFF2-40B4-BE49-F238E27FC236}">
+                <a16:creationId xmlns:a16="http://schemas.microsoft.com/office/drawing/2014/main" id="{B9512238-958B-4175-952D-57EA716E71C3}"/>
+              </a:ext>
+            </a:extLst>
+          </p:cNvPr>
           <p:cNvSpPr txBox="1"/>
           <p:nvPr/>
         </p:nvSpPr>
         <p:spPr>
           <a:xfrm>
-            <a:off x="0" y="1844853"/>
-            <a:ext cx="12192000" cy="3416320"/>
+            <a:off x="6095998" y="769441"/>
+            <a:ext cx="6095999" cy="4031873"/>
           </a:xfrm>
           <a:prstGeom prst="rect">
             <a:avLst/>
@@ -3702,77 +3808,88 @@
           </a:bodyPr>
           <a:lstStyle/>
           <a:p>
-            <a:r>
-              <a:rPr lang="ru-RU" sz="3600" dirty="0">
-                <a:solidFill>
-                  <a:srgbClr val="C00000"/>
-                </a:solidFill>
-                <a:latin typeface="Times New Roman" panose="02020603050405020304" pitchFamily="18" charset="0"/>
-                <a:cs typeface="Times New Roman" panose="02020603050405020304" pitchFamily="18" charset="0"/>
-              </a:rPr>
-              <a:t>● </a:t>
-            </a:r>
-            <a:r>
-              <a:rPr lang="ru-RU" sz="3600" dirty="0"/>
-              <a:t>Какие источники изучали?</a:t>
-            </a:r>
-          </a:p>
-          <a:p>
-            <a:r>
-              <a:rPr lang="ru-RU" sz="3600" dirty="0">
-                <a:solidFill>
-                  <a:srgbClr val="C00000"/>
-                </a:solidFill>
-                <a:latin typeface="Times New Roman" panose="02020603050405020304" pitchFamily="18" charset="0"/>
-                <a:cs typeface="Times New Roman" panose="02020603050405020304" pitchFamily="18" charset="0"/>
-              </a:rPr>
-              <a:t>● </a:t>
-            </a:r>
-            <a:r>
-              <a:rPr lang="ru-RU" sz="3600" dirty="0"/>
-              <a:t>Какую информацию из них использовали? </a:t>
-            </a:r>
-          </a:p>
-          <a:p>
-            <a:r>
-              <a:rPr lang="ru-RU" sz="3600" dirty="0">
-                <a:solidFill>
-                  <a:srgbClr val="C00000"/>
-                </a:solidFill>
-                <a:latin typeface="Times New Roman" panose="02020603050405020304" pitchFamily="18" charset="0"/>
-                <a:cs typeface="Times New Roman" panose="02020603050405020304" pitchFamily="18" charset="0"/>
-              </a:rPr>
-              <a:t>● </a:t>
-            </a:r>
-            <a:r>
-              <a:rPr lang="ru-RU" sz="3600" dirty="0"/>
-              <a:t>Что нового узнали?</a:t>
-            </a:r>
-          </a:p>
-          <a:p>
-            <a:r>
-              <a:rPr lang="ru-RU" sz="3600" dirty="0">
-                <a:solidFill>
-                  <a:srgbClr val="C00000"/>
-                </a:solidFill>
-                <a:latin typeface="Times New Roman" panose="02020603050405020304" pitchFamily="18" charset="0"/>
-                <a:cs typeface="Times New Roman" panose="02020603050405020304" pitchFamily="18" charset="0"/>
-              </a:rPr>
-              <a:t>● </a:t>
-            </a:r>
-            <a:r>
-              <a:rPr lang="ru-RU" sz="3600" dirty="0"/>
-              <a:t>Как это продвинуло вас к достижению цели?</a:t>
-            </a:r>
-          </a:p>
-          <a:p>
-            <a:endParaRPr lang="ru-RU" sz="3600" dirty="0"/>
-          </a:p>
-          <a:p>
-            <a:pPr algn="ctr"/>
-            <a:r>
-              <a:rPr lang="ru-RU" sz="3600" dirty="0"/>
-              <a:t>Может быть 2-3 слайда</a:t>
+            <a:pPr marL="285750" indent="-285750">
+              <a:buFont typeface="Arial" panose="020B0604020202020204" pitchFamily="34" charset="0"/>
+              <a:buChar char="•"/>
+            </a:pPr>
+            <a:r>
+              <a:rPr lang="ru-RU" sz="3200" dirty="0"/>
+              <a:t>Знание основных тегов </a:t>
+            </a:r>
+            <a:r>
+              <a:rPr lang="en-US" sz="3200" dirty="0"/>
+              <a:t>HTML5</a:t>
+            </a:r>
+          </a:p>
+          <a:p>
+            <a:pPr marL="285750" indent="-285750">
+              <a:buFont typeface="Arial" panose="020B0604020202020204" pitchFamily="34" charset="0"/>
+              <a:buChar char="•"/>
+            </a:pPr>
+            <a:r>
+              <a:rPr lang="ru-RU" sz="3200" dirty="0"/>
+              <a:t>Структура </a:t>
+            </a:r>
+            <a:r>
+              <a:rPr lang="en-US" sz="3200" dirty="0"/>
+              <a:t>HTML </a:t>
+            </a:r>
+            <a:r>
+              <a:rPr lang="ru-RU" sz="3200" dirty="0"/>
+              <a:t>документа</a:t>
+            </a:r>
+          </a:p>
+          <a:p>
+            <a:pPr marL="285750" indent="-285750">
+              <a:buFont typeface="Arial" panose="020B0604020202020204" pitchFamily="34" charset="0"/>
+              <a:buChar char="•"/>
+            </a:pPr>
+            <a:r>
+              <a:rPr lang="ru-RU" sz="3200" dirty="0"/>
+              <a:t>Понятие </a:t>
+            </a:r>
+            <a:r>
+              <a:rPr lang="en-US" sz="3200" dirty="0"/>
+              <a:t>CSS </a:t>
+            </a:r>
+            <a:r>
+              <a:rPr lang="ru-RU" sz="3200" dirty="0"/>
+              <a:t>класса</a:t>
+            </a:r>
+          </a:p>
+          <a:p>
+            <a:pPr marL="285750" indent="-285750">
+              <a:buFont typeface="Arial" panose="020B0604020202020204" pitchFamily="34" charset="0"/>
+              <a:buChar char="•"/>
+            </a:pPr>
+            <a:r>
+              <a:rPr lang="ru-RU" sz="3200" dirty="0"/>
+              <a:t>Основные свойства </a:t>
+            </a:r>
+            <a:r>
+              <a:rPr lang="en-US" sz="3200" dirty="0"/>
+              <a:t>CSS3</a:t>
+            </a:r>
+            <a:endParaRPr lang="ru-RU" sz="3200" dirty="0"/>
+          </a:p>
+          <a:p>
+            <a:pPr marL="285750" indent="-285750">
+              <a:buFont typeface="Arial" panose="020B0604020202020204" pitchFamily="34" charset="0"/>
+              <a:buChar char="•"/>
+            </a:pPr>
+            <a:r>
+              <a:rPr lang="ru-RU" sz="3200" dirty="0"/>
+              <a:t>Различные способы задания стилей элементов</a:t>
+            </a:r>
+          </a:p>
+          <a:p>
+            <a:pPr marL="285750" indent="-285750">
+              <a:buFont typeface="Arial" panose="020B0604020202020204" pitchFamily="34" charset="0"/>
+              <a:buChar char="•"/>
+            </a:pPr>
+            <a:r>
+              <a:rPr lang="ru-RU" sz="3200" dirty="0"/>
+              <a:t>Подключение внешних файлов (шрифты, стили)</a:t>
             </a:r>
           </a:p>
         </p:txBody>
@@ -3809,7 +3926,7 @@
       </p:grpSpPr>
       <p:sp>
         <p:nvSpPr>
-          <p:cNvPr id="5" name="Прямоугольник 4"/>
+          <p:cNvPr id="6" name="Прямоугольник 5"/>
           <p:cNvSpPr/>
           <p:nvPr/>
         </p:nvSpPr>
@@ -3837,21 +3954,27 @@
             <a:pPr algn="ctr"/>
             <a:r>
               <a:rPr lang="ru-RU" sz="4400" b="1" i="1" dirty="0"/>
-              <a:t>ЗАКЛЮЧЕНИЕ ПО ТЕОРЕТИЧЕСКОЙ ЧАСТИ</a:t>
-            </a:r>
-          </a:p>
-        </p:txBody>
-      </p:sp>
-      <p:sp>
-        <p:nvSpPr>
-          <p:cNvPr id="6" name="TextBox 5"/>
+              <a:t>ИНФОРМАЦИОННАЯ ПРОРАБОТАННОСТЬ</a:t>
+            </a:r>
+          </a:p>
+        </p:txBody>
+      </p:sp>
+      <p:sp>
+        <p:nvSpPr>
+          <p:cNvPr id="7" name="TextBox 6">
+            <a:extLst>
+              <a:ext uri="{FF2B5EF4-FFF2-40B4-BE49-F238E27FC236}">
+                <a16:creationId xmlns:a16="http://schemas.microsoft.com/office/drawing/2014/main" id="{3E383F1B-6BC2-430A-B83F-1094707859B6}"/>
+              </a:ext>
+            </a:extLst>
+          </p:cNvPr>
           <p:cNvSpPr txBox="1"/>
           <p:nvPr/>
         </p:nvSpPr>
         <p:spPr>
           <a:xfrm>
-            <a:off x="0" y="1434036"/>
-            <a:ext cx="11832656" cy="1754326"/>
+            <a:off x="4488872" y="769439"/>
+            <a:ext cx="7703128" cy="6124754"/>
           </a:xfrm>
           <a:prstGeom prst="rect">
             <a:avLst/>
@@ -3864,78 +3987,628 @@
           </a:bodyPr>
           <a:lstStyle/>
           <a:p>
-            <a:r>
-              <a:rPr lang="ru-RU" sz="3600" dirty="0">
-                <a:solidFill>
-                  <a:srgbClr val="C00000"/>
-                </a:solidFill>
-                <a:latin typeface="Times New Roman" panose="02020603050405020304" pitchFamily="18" charset="0"/>
-                <a:cs typeface="Times New Roman" panose="02020603050405020304" pitchFamily="18" charset="0"/>
-              </a:rPr>
-              <a:t>● </a:t>
-            </a:r>
+            <a:pPr marL="285750" indent="-285750">
+              <a:buFont typeface="Arial" panose="020B0604020202020204" pitchFamily="34" charset="0"/>
+              <a:buChar char="•"/>
+            </a:pPr>
             <a:r>
               <a:rPr lang="ru-RU" sz="3600" dirty="0"/>
-              <a:t>Тезис …</a:t>
-            </a:r>
-          </a:p>
-          <a:p>
-            <a:r>
-              <a:rPr lang="ru-RU" sz="3600" dirty="0">
-                <a:solidFill>
-                  <a:srgbClr val="C00000"/>
-                </a:solidFill>
-                <a:latin typeface="Times New Roman" panose="02020603050405020304" pitchFamily="18" charset="0"/>
-                <a:cs typeface="Times New Roman" panose="02020603050405020304" pitchFamily="18" charset="0"/>
-              </a:rPr>
-              <a:t>● </a:t>
+              <a:t>Быстрый поиск нужных тегов </a:t>
+            </a:r>
+            <a:r>
+              <a:rPr lang="en-US" sz="3600" dirty="0"/>
+              <a:t>HTML5 </a:t>
             </a:r>
             <a:r>
               <a:rPr lang="ru-RU" sz="3600" dirty="0"/>
-              <a:t>Тезис …</a:t>
-            </a:r>
-          </a:p>
-          <a:p>
-            <a:r>
-              <a:rPr lang="ru-RU" sz="3600" dirty="0">
-                <a:solidFill>
-                  <a:srgbClr val="C00000"/>
-                </a:solidFill>
-                <a:latin typeface="Times New Roman" panose="02020603050405020304" pitchFamily="18" charset="0"/>
-                <a:cs typeface="Times New Roman" panose="02020603050405020304" pitchFamily="18" charset="0"/>
-              </a:rPr>
-              <a:t>● </a:t>
+              <a:t>и свойств </a:t>
+            </a:r>
+            <a:r>
+              <a:rPr lang="en-US" sz="3600" dirty="0"/>
+              <a:t>CSS3</a:t>
             </a:r>
             <a:r>
               <a:rPr lang="ru-RU" sz="3600" dirty="0"/>
-              <a:t>Тезис …</a:t>
-            </a:r>
+              <a:t> с описанием того, что они делают</a:t>
+            </a:r>
+          </a:p>
+          <a:p>
+            <a:pPr marL="285750" indent="-285750">
+              <a:buFont typeface="Arial" panose="020B0604020202020204" pitchFamily="34" charset="0"/>
+              <a:buChar char="•"/>
+            </a:pPr>
+            <a:r>
+              <a:rPr lang="ru-RU" sz="3600" dirty="0"/>
+              <a:t>Образцы использования тегов </a:t>
+            </a:r>
+            <a:r>
+              <a:rPr lang="en-US" sz="3600" dirty="0"/>
+              <a:t>HTML5 </a:t>
+            </a:r>
+            <a:r>
+              <a:rPr lang="ru-RU" sz="3600" dirty="0"/>
+              <a:t>и свойств </a:t>
+            </a:r>
+            <a:r>
+              <a:rPr lang="en-US" sz="3600" dirty="0"/>
+              <a:t>CSS3 c </a:t>
+            </a:r>
+            <a:r>
+              <a:rPr lang="ru-RU" sz="3600" dirty="0"/>
+              <a:t>наглядными интерактивными примерами</a:t>
+            </a:r>
+          </a:p>
+          <a:p>
+            <a:pPr marL="285750" indent="-285750">
+              <a:buFont typeface="Arial" panose="020B0604020202020204" pitchFamily="34" charset="0"/>
+              <a:buChar char="•"/>
+            </a:pPr>
+            <a:r>
+              <a:rPr lang="ru-RU" sz="3600" dirty="0"/>
+              <a:t>Поддержка тех или иных тегов и свойств браузерами</a:t>
+            </a:r>
+          </a:p>
+          <a:p>
+            <a:pPr marL="285750" indent="-285750">
+              <a:buFont typeface="Arial" panose="020B0604020202020204" pitchFamily="34" charset="0"/>
+              <a:buChar char="•"/>
+            </a:pPr>
+            <a:r>
+              <a:rPr lang="ru-RU" sz="3600" dirty="0"/>
+              <a:t>Документация по актуальной версии </a:t>
+            </a:r>
+            <a:r>
+              <a:rPr lang="en-US" sz="3600" dirty="0"/>
+              <a:t>Django</a:t>
+            </a:r>
+            <a:r>
+              <a:rPr lang="ru-RU" sz="3600" dirty="0"/>
+              <a:t> на русском языке</a:t>
+            </a:r>
+            <a:endParaRPr lang="en-US" sz="3600" dirty="0"/>
+          </a:p>
+          <a:p>
+            <a:pPr marL="285750" indent="-285750">
+              <a:buFont typeface="Arial" panose="020B0604020202020204" pitchFamily="34" charset="0"/>
+              <a:buChar char="•"/>
+            </a:pPr>
+            <a:endParaRPr lang="ru-RU" sz="3200" dirty="0"/>
           </a:p>
         </p:txBody>
       </p:sp>
       <p:pic>
         <p:nvPicPr>
-          <p:cNvPr id="4" name="Рисунок 3"/>
+          <p:cNvPr id="9" name="Рисунок 8">
+            <a:extLst>
+              <a:ext uri="{FF2B5EF4-FFF2-40B4-BE49-F238E27FC236}">
+                <a16:creationId xmlns:a16="http://schemas.microsoft.com/office/drawing/2014/main" id="{548C7D29-12FB-4201-B6D4-822D51FDE09E}"/>
+              </a:ext>
+            </a:extLst>
+          </p:cNvPr>
           <p:cNvPicPr>
             <a:picLocks noChangeAspect="1"/>
           </p:cNvPicPr>
           <p:nvPr/>
         </p:nvPicPr>
-        <p:blipFill rotWithShape="1">
-          <a:blip r:embed="rId2"/>
-          <a:srcRect l="17334" t="36692" r="18934" b="21475"/>
-          <a:stretch/>
+        <p:blipFill>
+          <a:blip r:embed="rId2">
+            <a:extLst>
+              <a:ext uri="{28A0092B-C50C-407E-A947-70E740481C1C}">
+                <a14:useLocalDpi xmlns:a14="http://schemas.microsoft.com/office/drawing/2010/main" val="0"/>
+              </a:ext>
+            </a:extLst>
+          </a:blip>
+          <a:stretch>
+            <a:fillRect/>
+          </a:stretch>
         </p:blipFill>
         <p:spPr>
           <a:xfrm>
-            <a:off x="1987826" y="3485781"/>
-            <a:ext cx="9170504" cy="3372219"/>
+            <a:off x="-1" y="769440"/>
+            <a:ext cx="4488873" cy="6084477"/>
           </a:xfrm>
           <a:prstGeom prst="rect">
             <a:avLst/>
           </a:prstGeom>
         </p:spPr>
       </p:pic>
+    </p:spTree>
+    <p:extLst>
+      <p:ext uri="{BB962C8B-B14F-4D97-AF65-F5344CB8AC3E}">
+        <p14:creationId xmlns:p14="http://schemas.microsoft.com/office/powerpoint/2010/main" val="3263893979"/>
+      </p:ext>
+    </p:extLst>
+  </p:cSld>
+  <p:clrMapOvr>
+    <a:masterClrMapping/>
+  </p:clrMapOvr>
+</p:sld>
+</file>
+
+<file path=ppt/slides/slide6.xml><?xml version="1.0" encoding="utf-8"?>
+<p:sld xmlns:a="http://schemas.openxmlformats.org/drawingml/2006/main" xmlns:r="http://schemas.openxmlformats.org/officeDocument/2006/relationships" xmlns:p="http://schemas.openxmlformats.org/presentationml/2006/main">
+  <p:cSld>
+    <p:spTree>
+      <p:nvGrpSpPr>
+        <p:cNvPr id="1" name=""/>
+        <p:cNvGrpSpPr/>
+        <p:nvPr/>
+      </p:nvGrpSpPr>
+      <p:grpSpPr>
+        <a:xfrm>
+          <a:off x="0" y="0"/>
+          <a:ext cx="0" cy="0"/>
+          <a:chOff x="0" y="0"/>
+          <a:chExt cx="0" cy="0"/>
+        </a:xfrm>
+      </p:grpSpPr>
+      <p:sp>
+        <p:nvSpPr>
+          <p:cNvPr id="6" name="Прямоугольник 5"/>
+          <p:cNvSpPr/>
+          <p:nvPr/>
+        </p:nvSpPr>
+        <p:spPr>
+          <a:xfrm>
+            <a:off x="0" y="0"/>
+            <a:ext cx="12192000" cy="769441"/>
+          </a:xfrm>
+          <a:prstGeom prst="rect">
+            <a:avLst/>
+          </a:prstGeom>
+          <a:solidFill>
+            <a:schemeClr val="accent6">
+              <a:lumMod val="40000"/>
+              <a:lumOff val="60000"/>
+            </a:schemeClr>
+          </a:solidFill>
+        </p:spPr>
+        <p:txBody>
+          <a:bodyPr wrap="square">
+            <a:spAutoFit/>
+          </a:bodyPr>
+          <a:lstStyle/>
+          <a:p>
+            <a:pPr algn="ctr"/>
+            <a:r>
+              <a:rPr lang="ru-RU" sz="4400" b="1" i="1" dirty="0"/>
+              <a:t>ИНФОРМАЦИОННАЯ ПРОРАБОТАННОСТЬ</a:t>
+            </a:r>
+          </a:p>
+        </p:txBody>
+      </p:sp>
+      <p:pic>
+        <p:nvPicPr>
+          <p:cNvPr id="3" name="Рисунок 2">
+            <a:extLst>
+              <a:ext uri="{FF2B5EF4-FFF2-40B4-BE49-F238E27FC236}">
+                <a16:creationId xmlns:a16="http://schemas.microsoft.com/office/drawing/2014/main" id="{A28B2175-3EFB-4B7A-B263-2F9B3BE16355}"/>
+              </a:ext>
+            </a:extLst>
+          </p:cNvPr>
+          <p:cNvPicPr>
+            <a:picLocks noChangeAspect="1"/>
+          </p:cNvPicPr>
+          <p:nvPr/>
+        </p:nvPicPr>
+        <p:blipFill>
+          <a:blip r:embed="rId2">
+            <a:extLst>
+              <a:ext uri="{28A0092B-C50C-407E-A947-70E740481C1C}">
+                <a14:useLocalDpi xmlns:a14="http://schemas.microsoft.com/office/drawing/2010/main" val="0"/>
+              </a:ext>
+            </a:extLst>
+          </a:blip>
+          <a:stretch>
+            <a:fillRect/>
+          </a:stretch>
+        </p:blipFill>
+        <p:spPr>
+          <a:xfrm>
+            <a:off x="0" y="769441"/>
+            <a:ext cx="4304145" cy="6108540"/>
+          </a:xfrm>
+          <a:prstGeom prst="rect">
+            <a:avLst/>
+          </a:prstGeom>
+        </p:spPr>
+      </p:pic>
+      <p:sp>
+        <p:nvSpPr>
+          <p:cNvPr id="8" name="TextBox 7">
+            <a:extLst>
+              <a:ext uri="{FF2B5EF4-FFF2-40B4-BE49-F238E27FC236}">
+                <a16:creationId xmlns:a16="http://schemas.microsoft.com/office/drawing/2014/main" id="{8FE18801-F4D9-47A6-A675-9DC4E9C915D5}"/>
+              </a:ext>
+            </a:extLst>
+          </p:cNvPr>
+          <p:cNvSpPr txBox="1"/>
+          <p:nvPr/>
+        </p:nvSpPr>
+        <p:spPr>
+          <a:xfrm>
+            <a:off x="4008582" y="769439"/>
+            <a:ext cx="8183418" cy="2554545"/>
+          </a:xfrm>
+          <a:prstGeom prst="rect">
+            <a:avLst/>
+          </a:prstGeom>
+          <a:noFill/>
+        </p:spPr>
+        <p:txBody>
+          <a:bodyPr wrap="square" rtlCol="0">
+            <a:spAutoFit/>
+          </a:bodyPr>
+          <a:lstStyle/>
+          <a:p>
+            <a:pPr marL="285750" indent="-285750">
+              <a:buFont typeface="Arial" panose="020B0604020202020204" pitchFamily="34" charset="0"/>
+              <a:buChar char="•"/>
+            </a:pPr>
+            <a:r>
+              <a:rPr lang="ru-RU" sz="3200" dirty="0"/>
+              <a:t>Сравнительные таблицы </a:t>
+            </a:r>
+            <a:r>
+              <a:rPr lang="en-US" sz="3200" dirty="0"/>
+              <a:t>CMS </a:t>
+            </a:r>
+            <a:r>
+              <a:rPr lang="ru-RU" sz="3200" dirty="0"/>
+              <a:t>и конструкторов</a:t>
+            </a:r>
+            <a:endParaRPr lang="en-US" sz="3200" dirty="0"/>
+          </a:p>
+          <a:p>
+            <a:pPr marL="285750" indent="-285750">
+              <a:buFont typeface="Arial" panose="020B0604020202020204" pitchFamily="34" charset="0"/>
+              <a:buChar char="•"/>
+            </a:pPr>
+            <a:r>
+              <a:rPr lang="ru-RU" sz="3200" dirty="0"/>
+              <a:t>Определение способов создания сайта</a:t>
+            </a:r>
+          </a:p>
+          <a:p>
+            <a:pPr marL="285750" indent="-285750">
+              <a:buFont typeface="Arial" panose="020B0604020202020204" pitchFamily="34" charset="0"/>
+              <a:buChar char="•"/>
+            </a:pPr>
+            <a:r>
+              <a:rPr lang="ru-RU" sz="3200" dirty="0"/>
+              <a:t>Анализ плюсов и минусов каждого из способов</a:t>
+            </a:r>
+          </a:p>
+        </p:txBody>
+      </p:sp>
+    </p:spTree>
+    <p:extLst>
+      <p:ext uri="{BB962C8B-B14F-4D97-AF65-F5344CB8AC3E}">
+        <p14:creationId xmlns:p14="http://schemas.microsoft.com/office/powerpoint/2010/main" val="859097540"/>
+      </p:ext>
+    </p:extLst>
+  </p:cSld>
+  <p:clrMapOvr>
+    <a:masterClrMapping/>
+  </p:clrMapOvr>
+</p:sld>
+</file>
+
+<file path=ppt/slides/slide7.xml><?xml version="1.0" encoding="utf-8"?>
+<p:sld xmlns:a="http://schemas.openxmlformats.org/drawingml/2006/main" xmlns:r="http://schemas.openxmlformats.org/officeDocument/2006/relationships" xmlns:p="http://schemas.openxmlformats.org/presentationml/2006/main">
+  <p:cSld>
+    <p:spTree>
+      <p:nvGrpSpPr>
+        <p:cNvPr id="1" name=""/>
+        <p:cNvGrpSpPr/>
+        <p:nvPr/>
+      </p:nvGrpSpPr>
+      <p:grpSpPr>
+        <a:xfrm>
+          <a:off x="0" y="0"/>
+          <a:ext cx="0" cy="0"/>
+          <a:chOff x="0" y="0"/>
+          <a:chExt cx="0" cy="0"/>
+        </a:xfrm>
+      </p:grpSpPr>
+      <p:sp>
+        <p:nvSpPr>
+          <p:cNvPr id="6" name="Прямоугольник 5"/>
+          <p:cNvSpPr/>
+          <p:nvPr/>
+        </p:nvSpPr>
+        <p:spPr>
+          <a:xfrm>
+            <a:off x="0" y="0"/>
+            <a:ext cx="12192000" cy="769441"/>
+          </a:xfrm>
+          <a:prstGeom prst="rect">
+            <a:avLst/>
+          </a:prstGeom>
+          <a:solidFill>
+            <a:schemeClr val="accent6">
+              <a:lumMod val="40000"/>
+              <a:lumOff val="60000"/>
+            </a:schemeClr>
+          </a:solidFill>
+        </p:spPr>
+        <p:txBody>
+          <a:bodyPr wrap="square">
+            <a:spAutoFit/>
+          </a:bodyPr>
+          <a:lstStyle/>
+          <a:p>
+            <a:pPr algn="ctr"/>
+            <a:r>
+              <a:rPr lang="ru-RU" sz="4400" b="1" i="1" dirty="0"/>
+              <a:t>ИНФОРМАЦИОННАЯ ПРОРАБОТАННОСТЬ</a:t>
+            </a:r>
+          </a:p>
+        </p:txBody>
+      </p:sp>
+      <p:pic>
+        <p:nvPicPr>
+          <p:cNvPr id="4" name="Рисунок 3">
+            <a:extLst>
+              <a:ext uri="{FF2B5EF4-FFF2-40B4-BE49-F238E27FC236}">
+                <a16:creationId xmlns:a16="http://schemas.microsoft.com/office/drawing/2014/main" id="{19C57D5B-7689-4949-BA58-31387EE84EA9}"/>
+              </a:ext>
+            </a:extLst>
+          </p:cNvPr>
+          <p:cNvPicPr>
+            <a:picLocks noChangeAspect="1"/>
+          </p:cNvPicPr>
+          <p:nvPr/>
+        </p:nvPicPr>
+        <p:blipFill>
+          <a:blip r:embed="rId2">
+            <a:extLst>
+              <a:ext uri="{28A0092B-C50C-407E-A947-70E740481C1C}">
+                <a14:useLocalDpi xmlns:a14="http://schemas.microsoft.com/office/drawing/2010/main" val="0"/>
+              </a:ext>
+            </a:extLst>
+          </a:blip>
+          <a:stretch>
+            <a:fillRect/>
+          </a:stretch>
+        </p:blipFill>
+        <p:spPr>
+          <a:xfrm>
+            <a:off x="-1" y="769440"/>
+            <a:ext cx="5995503" cy="6088559"/>
+          </a:xfrm>
+          <a:prstGeom prst="rect">
+            <a:avLst/>
+          </a:prstGeom>
+        </p:spPr>
+      </p:pic>
+      <p:sp>
+        <p:nvSpPr>
+          <p:cNvPr id="7" name="TextBox 6">
+            <a:extLst>
+              <a:ext uri="{FF2B5EF4-FFF2-40B4-BE49-F238E27FC236}">
+                <a16:creationId xmlns:a16="http://schemas.microsoft.com/office/drawing/2014/main" id="{93F51F26-9AB8-4A61-8642-7256FF1AAD52}"/>
+              </a:ext>
+            </a:extLst>
+          </p:cNvPr>
+          <p:cNvSpPr txBox="1"/>
+          <p:nvPr/>
+        </p:nvSpPr>
+        <p:spPr>
+          <a:xfrm>
+            <a:off x="5995502" y="769439"/>
+            <a:ext cx="6196498" cy="1754326"/>
+          </a:xfrm>
+          <a:prstGeom prst="rect">
+            <a:avLst/>
+          </a:prstGeom>
+          <a:noFill/>
+        </p:spPr>
+        <p:txBody>
+          <a:bodyPr wrap="square" rtlCol="0">
+            <a:spAutoFit/>
+          </a:bodyPr>
+          <a:lstStyle/>
+          <a:p>
+            <a:pPr marL="285750" indent="-285750">
+              <a:buFont typeface="Arial" panose="020B0604020202020204" pitchFamily="34" charset="0"/>
+              <a:buChar char="•"/>
+            </a:pPr>
+            <a:r>
+              <a:rPr lang="ru-RU" sz="3600" dirty="0"/>
+              <a:t>Возможность быстро найти научные работы и статьи по любой тематике</a:t>
+            </a:r>
+          </a:p>
+        </p:txBody>
+      </p:sp>
+    </p:spTree>
+    <p:extLst>
+      <p:ext uri="{BB962C8B-B14F-4D97-AF65-F5344CB8AC3E}">
+        <p14:creationId xmlns:p14="http://schemas.microsoft.com/office/powerpoint/2010/main" val="3869802749"/>
+      </p:ext>
+    </p:extLst>
+  </p:cSld>
+  <p:clrMapOvr>
+    <a:masterClrMapping/>
+  </p:clrMapOvr>
+</p:sld>
+</file>
+
+<file path=ppt/slides/slide8.xml><?xml version="1.0" encoding="utf-8"?>
+<p:sld xmlns:a="http://schemas.openxmlformats.org/drawingml/2006/main" xmlns:r="http://schemas.openxmlformats.org/officeDocument/2006/relationships" xmlns:p="http://schemas.openxmlformats.org/presentationml/2006/main">
+  <p:cSld>
+    <p:spTree>
+      <p:nvGrpSpPr>
+        <p:cNvPr id="1" name=""/>
+        <p:cNvGrpSpPr/>
+        <p:nvPr/>
+      </p:nvGrpSpPr>
+      <p:grpSpPr>
+        <a:xfrm>
+          <a:off x="0" y="0"/>
+          <a:ext cx="0" cy="0"/>
+          <a:chOff x="0" y="0"/>
+          <a:chExt cx="0" cy="0"/>
+        </a:xfrm>
+      </p:grpSpPr>
+      <p:sp>
+        <p:nvSpPr>
+          <p:cNvPr id="5" name="Прямоугольник 4"/>
+          <p:cNvSpPr/>
+          <p:nvPr/>
+        </p:nvSpPr>
+        <p:spPr>
+          <a:xfrm>
+            <a:off x="0" y="0"/>
+            <a:ext cx="12192000" cy="769441"/>
+          </a:xfrm>
+          <a:prstGeom prst="rect">
+            <a:avLst/>
+          </a:prstGeom>
+          <a:solidFill>
+            <a:schemeClr val="accent6">
+              <a:lumMod val="40000"/>
+              <a:lumOff val="60000"/>
+            </a:schemeClr>
+          </a:solidFill>
+        </p:spPr>
+        <p:txBody>
+          <a:bodyPr wrap="square">
+            <a:spAutoFit/>
+          </a:bodyPr>
+          <a:lstStyle/>
+          <a:p>
+            <a:pPr algn="ctr"/>
+            <a:r>
+              <a:rPr lang="ru-RU" sz="4400" b="1" i="1" dirty="0"/>
+              <a:t>ЗАКЛЮЧЕНИЕ ПО ТЕОРЕТИЧЕСКОЙ ЧАСТИ</a:t>
+            </a:r>
+          </a:p>
+        </p:txBody>
+      </p:sp>
+      <p:sp>
+        <p:nvSpPr>
+          <p:cNvPr id="6" name="TextBox 5"/>
+          <p:cNvSpPr txBox="1"/>
+          <p:nvPr/>
+        </p:nvSpPr>
+        <p:spPr>
+          <a:xfrm>
+            <a:off x="0" y="769441"/>
+            <a:ext cx="12192000" cy="5078313"/>
+          </a:xfrm>
+          <a:prstGeom prst="rect">
+            <a:avLst/>
+          </a:prstGeom>
+          <a:noFill/>
+        </p:spPr>
+        <p:txBody>
+          <a:bodyPr wrap="square" rtlCol="0">
+            <a:spAutoFit/>
+          </a:bodyPr>
+          <a:lstStyle/>
+          <a:p>
+            <a:pPr marL="285750" indent="-285750">
+              <a:buFont typeface="Arial" panose="020B0604020202020204" pitchFamily="34" charset="0"/>
+              <a:buChar char="•"/>
+            </a:pPr>
+            <a:r>
+              <a:rPr lang="ru-RU" sz="3600" dirty="0">
+                <a:solidFill>
+                  <a:schemeClr val="tx1">
+                    <a:lumMod val="95000"/>
+                    <a:lumOff val="5000"/>
+                  </a:schemeClr>
+                </a:solidFill>
+                <a:latin typeface="Times New Roman" panose="02020603050405020304" pitchFamily="18" charset="0"/>
+                <a:cs typeface="Times New Roman" panose="02020603050405020304" pitchFamily="18" charset="0"/>
+              </a:rPr>
+              <a:t>Цель достигнута – сайт создан.</a:t>
+            </a:r>
+            <a:endParaRPr lang="ru-RU" sz="3600" dirty="0">
+              <a:solidFill>
+                <a:schemeClr val="tx1">
+                  <a:lumMod val="95000"/>
+                  <a:lumOff val="5000"/>
+                </a:schemeClr>
+              </a:solidFill>
+            </a:endParaRPr>
+          </a:p>
+          <a:p>
+            <a:pPr marL="285750" indent="-285750">
+              <a:buFont typeface="Arial" panose="020B0604020202020204" pitchFamily="34" charset="0"/>
+              <a:buChar char="•"/>
+            </a:pPr>
+            <a:r>
+              <a:rPr lang="ru-RU" sz="3600" dirty="0">
+                <a:solidFill>
+                  <a:schemeClr val="tx1">
+                    <a:lumMod val="95000"/>
+                    <a:lumOff val="5000"/>
+                  </a:schemeClr>
+                </a:solidFill>
+                <a:latin typeface="Times New Roman" panose="02020603050405020304" pitchFamily="18" charset="0"/>
+                <a:cs typeface="Times New Roman" panose="02020603050405020304" pitchFamily="18" charset="0"/>
+              </a:rPr>
+              <a:t>Замыслы проекта соответствуют результатам теоретического исследования – выбран  наиболее эффективный способ создания сайта.</a:t>
+            </a:r>
+            <a:endParaRPr lang="ru-RU" sz="3600" dirty="0">
+              <a:solidFill>
+                <a:schemeClr val="tx1">
+                  <a:lumMod val="95000"/>
+                  <a:lumOff val="5000"/>
+                </a:schemeClr>
+              </a:solidFill>
+            </a:endParaRPr>
+          </a:p>
+          <a:p>
+            <a:pPr marL="285750" indent="-285750">
+              <a:buFont typeface="Arial" panose="020B0604020202020204" pitchFamily="34" charset="0"/>
+              <a:buChar char="•"/>
+            </a:pPr>
+            <a:r>
+              <a:rPr lang="ru-RU" sz="3600" dirty="0">
+                <a:solidFill>
+                  <a:schemeClr val="tx1">
+                    <a:lumMod val="95000"/>
+                    <a:lumOff val="5000"/>
+                  </a:schemeClr>
+                </a:solidFill>
+                <a:latin typeface="Times New Roman" panose="02020603050405020304" pitchFamily="18" charset="0"/>
+                <a:cs typeface="Times New Roman" panose="02020603050405020304" pitchFamily="18" charset="0"/>
+              </a:rPr>
+              <a:t>На данный момент сайт создан таким, каким он был задуман изначально и размещен на хостинге в интернете. Запланированная функциональность реализована.</a:t>
+            </a:r>
+          </a:p>
+          <a:p>
+            <a:pPr marL="285750" indent="-285750">
+              <a:buFont typeface="Arial" panose="020B0604020202020204" pitchFamily="34" charset="0"/>
+              <a:buChar char="•"/>
+            </a:pPr>
+            <a:r>
+              <a:rPr lang="ru-RU" sz="3600" dirty="0">
+                <a:solidFill>
+                  <a:schemeClr val="tx1">
+                    <a:lumMod val="95000"/>
+                    <a:lumOff val="5000"/>
+                  </a:schemeClr>
+                </a:solidFill>
+                <a:latin typeface="Times New Roman" panose="02020603050405020304" pitchFamily="18" charset="0"/>
+                <a:cs typeface="Times New Roman" panose="02020603050405020304" pitchFamily="18" charset="0"/>
+              </a:rPr>
+              <a:t>Практическая часть исследования полностью выполнена – описан процесс создания во всех подробностях.</a:t>
+            </a:r>
+            <a:endParaRPr lang="ru-RU" sz="3600" dirty="0">
+              <a:solidFill>
+                <a:schemeClr val="tx1">
+                  <a:lumMod val="95000"/>
+                  <a:lumOff val="5000"/>
+                </a:schemeClr>
+              </a:solidFill>
+            </a:endParaRPr>
+          </a:p>
+        </p:txBody>
+      </p:sp>
     </p:spTree>
     <p:extLst>
       <p:ext uri="{BB962C8B-B14F-4D97-AF65-F5344CB8AC3E}">

</xml_diff>